<commit_message>
fix bug report Semen ne daet adenu
</commit_message>
<xml_diff>
--- a/презентация (1).pptx
+++ b/презентация (1).pptx
@@ -14,8 +14,8 @@
     <p:sldId id="275" r:id="rId9"/>
     <p:sldId id="276" r:id="rId10"/>
     <p:sldId id="277" r:id="rId11"/>
-    <p:sldId id="272" r:id="rId12"/>
-    <p:sldId id="278" r:id="rId13"/>
+    <p:sldId id="278" r:id="rId12"/>
+    <p:sldId id="272" r:id="rId13"/>
   </p:sldIdLst>
   <p:sldSz cx="16256000" cy="11506200"/>
   <p:notesSz cx="6858000" cy="9144000"/>
@@ -763,7 +763,7 @@
           </a:ln>
           <a:extLst>
             <a:ext uri="{C572A759-6A51-4108-AA02-DFA0A04FC94B}">
-              <ma14:wrappingTextBoxFlag xmlns="" xmlns:m="http://schemas.openxmlformats.org/officeDocument/2006/math" xmlns:a14="http://schemas.microsoft.com/office/drawing/2010/main" xmlns:ma14="http://schemas.microsoft.com/office/mac/drawingml/2011/main" val="1"/>
+              <ma14:wrappingTextBoxFlag xmlns:ma14="http://schemas.microsoft.com/office/mac/drawingml/2011/main" xmlns:a14="http://schemas.microsoft.com/office/drawing/2010/main" xmlns:m="http://schemas.openxmlformats.org/officeDocument/2006/math" xmlns="" val="1"/>
             </a:ext>
           </a:extLst>
         </p:spPr>
@@ -1105,7 +1105,7 @@
           </a:ln>
           <a:extLst>
             <a:ext uri="{C572A759-6A51-4108-AA02-DFA0A04FC94B}">
-              <ma14:wrappingTextBoxFlag xmlns="" xmlns:m="http://schemas.openxmlformats.org/officeDocument/2006/math" xmlns:a14="http://schemas.microsoft.com/office/drawing/2010/main" xmlns:ma14="http://schemas.microsoft.com/office/mac/drawingml/2011/main" val="1"/>
+              <ma14:wrappingTextBoxFlag xmlns:ma14="http://schemas.microsoft.com/office/mac/drawingml/2011/main" xmlns:a14="http://schemas.microsoft.com/office/drawing/2010/main" xmlns:m="http://schemas.openxmlformats.org/officeDocument/2006/math" xmlns="" val="1"/>
             </a:ext>
           </a:extLst>
         </p:spPr>
@@ -1168,7 +1168,7 @@
           </a:ln>
           <a:extLst>
             <a:ext uri="{C572A759-6A51-4108-AA02-DFA0A04FC94B}">
-              <ma14:wrappingTextBoxFlag xmlns="" xmlns:m="http://schemas.openxmlformats.org/officeDocument/2006/math" xmlns:a14="http://schemas.microsoft.com/office/drawing/2010/main" xmlns:ma14="http://schemas.microsoft.com/office/mac/drawingml/2011/main" val="1"/>
+              <ma14:wrappingTextBoxFlag xmlns:ma14="http://schemas.microsoft.com/office/mac/drawingml/2011/main" xmlns:a14="http://schemas.microsoft.com/office/drawing/2010/main" xmlns:m="http://schemas.openxmlformats.org/officeDocument/2006/math" xmlns="" val="1"/>
             </a:ext>
           </a:extLst>
         </p:spPr>
@@ -2137,7 +2137,7 @@
           </a:ln>
           <a:extLst>
             <a:ext uri="{C572A759-6A51-4108-AA02-DFA0A04FC94B}">
-              <ma14:wrappingTextBoxFlag xmlns="" xmlns:m="http://schemas.openxmlformats.org/officeDocument/2006/math" xmlns:a14="http://schemas.microsoft.com/office/drawing/2010/main" xmlns:ma14="http://schemas.microsoft.com/office/mac/drawingml/2011/main" val="1"/>
+              <ma14:wrappingTextBoxFlag xmlns:ma14="http://schemas.microsoft.com/office/mac/drawingml/2011/main" xmlns:a14="http://schemas.microsoft.com/office/drawing/2010/main" xmlns:m="http://schemas.openxmlformats.org/officeDocument/2006/math" xmlns="" val="1"/>
             </a:ext>
           </a:extLst>
         </p:spPr>
@@ -2548,7 +2548,7 @@
           </a:ln>
           <a:extLst>
             <a:ext uri="{C572A759-6A51-4108-AA02-DFA0A04FC94B}">
-              <ma14:wrappingTextBoxFlag xmlns="" xmlns:m="http://schemas.openxmlformats.org/officeDocument/2006/math" xmlns:a14="http://schemas.microsoft.com/office/drawing/2010/main" xmlns:ma14="http://schemas.microsoft.com/office/mac/drawingml/2011/main" val="1"/>
+              <ma14:wrappingTextBoxFlag xmlns:ma14="http://schemas.microsoft.com/office/mac/drawingml/2011/main" xmlns:a14="http://schemas.microsoft.com/office/drawing/2010/main" xmlns:m="http://schemas.openxmlformats.org/officeDocument/2006/math" xmlns="" val="1"/>
             </a:ext>
           </a:extLst>
         </p:spPr>
@@ -2949,7 +2949,7 @@
           </a:ln>
           <a:extLst>
             <a:ext uri="{C572A759-6A51-4108-AA02-DFA0A04FC94B}">
-              <ma14:wrappingTextBoxFlag xmlns="" xmlns:m="http://schemas.openxmlformats.org/officeDocument/2006/math" xmlns:a14="http://schemas.microsoft.com/office/drawing/2010/main" xmlns:ma14="http://schemas.microsoft.com/office/mac/drawingml/2011/main" val="1"/>
+              <ma14:wrappingTextBoxFlag xmlns:ma14="http://schemas.microsoft.com/office/mac/drawingml/2011/main" xmlns:a14="http://schemas.microsoft.com/office/drawing/2010/main" xmlns:m="http://schemas.openxmlformats.org/officeDocument/2006/math" xmlns="" val="1"/>
             </a:ext>
           </a:extLst>
         </p:spPr>
@@ -3151,7 +3151,7 @@
           </a:ln>
           <a:extLst>
             <a:ext uri="{C572A759-6A51-4108-AA02-DFA0A04FC94B}">
-              <ma14:wrappingTextBoxFlag xmlns="" xmlns:m="http://schemas.openxmlformats.org/officeDocument/2006/math" xmlns:a14="http://schemas.microsoft.com/office/drawing/2010/main" xmlns:ma14="http://schemas.microsoft.com/office/mac/drawingml/2011/main" val="1"/>
+              <ma14:wrappingTextBoxFlag xmlns:ma14="http://schemas.microsoft.com/office/mac/drawingml/2011/main" xmlns:a14="http://schemas.microsoft.com/office/drawing/2010/main" xmlns:m="http://schemas.openxmlformats.org/officeDocument/2006/math" xmlns="" val="1"/>
             </a:ext>
           </a:extLst>
         </p:spPr>
@@ -4029,624 +4029,6 @@
       </p:grpSpPr>
       <p:pic>
         <p:nvPicPr>
-          <p:cNvPr id="4098" name="Picture 2" descr="https://community.atlassian.com/t5/image/serverpage/image-id/47779iCB5165BBDF13640C?v=1.0"/>
-          <p:cNvPicPr>
-            <a:picLocks noChangeAspect="1" noChangeArrowheads="1"/>
-          </p:cNvPicPr>
-          <p:nvPr/>
-        </p:nvPicPr>
-        <p:blipFill>
-          <a:blip r:embed="rId3">
-            <a:extLst>
-              <a:ext uri="{28A0092B-C50C-407E-A947-70E740481C1C}">
-                <a14:useLocalDpi xmlns:a14="http://schemas.microsoft.com/office/drawing/2010/main" val="0"/>
-              </a:ext>
-            </a:extLst>
-          </a:blip>
-          <a:srcRect/>
-          <a:stretch>
-            <a:fillRect/>
-          </a:stretch>
-        </p:blipFill>
-        <p:spPr bwMode="auto">
-          <a:xfrm>
-            <a:off x="852121" y="2094617"/>
-            <a:ext cx="7061630" cy="8473958"/>
-          </a:xfrm>
-          <a:prstGeom prst="rect">
-            <a:avLst/>
-          </a:prstGeom>
-          <a:noFill/>
-          <a:extLst>
-            <a:ext uri="{909E8E84-426E-40DD-AFC4-6F175D3DCCD1}">
-              <a14:hiddenFill xmlns:a14="http://schemas.microsoft.com/office/drawing/2010/main">
-                <a:solidFill>
-                  <a:srgbClr val="FFFFFF"/>
-                </a:solidFill>
-              </a14:hiddenFill>
-            </a:ext>
-          </a:extLst>
-        </p:spPr>
-      </p:pic>
-      <p:sp>
-        <p:nvSpPr>
-          <p:cNvPr id="10" name="Rectangle"/>
-          <p:cNvSpPr/>
-          <p:nvPr/>
-        </p:nvSpPr>
-        <p:spPr>
-          <a:xfrm>
-            <a:off x="8323384" y="1173320"/>
-            <a:ext cx="7932616" cy="10349208"/>
-          </a:xfrm>
-          <a:prstGeom prst="rect">
-            <a:avLst/>
-          </a:prstGeom>
-          <a:solidFill>
-            <a:srgbClr val="61646A"/>
-          </a:solidFill>
-          <a:ln w="3175">
-            <a:miter lim="400000"/>
-          </a:ln>
-        </p:spPr>
-        <p:txBody>
-          <a:bodyPr lIns="67380" tIns="67380" rIns="67380" bIns="67380" anchor="ctr"/>
-          <a:lstStyle/>
-          <a:p>
-            <a:pPr>
-              <a:defRPr sz="2400" b="0">
-                <a:solidFill>
-                  <a:srgbClr val="FFFFFF"/>
-                </a:solidFill>
-                <a:latin typeface="+mj-lt"/>
-                <a:ea typeface="+mj-ea"/>
-                <a:cs typeface="+mj-cs"/>
-                <a:sym typeface="Helvetica Neue Medium"/>
-              </a:defRPr>
-            </a:pPr>
-            <a:endParaRPr/>
-          </a:p>
-        </p:txBody>
-      </p:sp>
-      <p:sp>
-        <p:nvSpPr>
-          <p:cNvPr id="2" name="Текст 1"/>
-          <p:cNvSpPr>
-            <a:spLocks noGrp="1"/>
-          </p:cNvSpPr>
-          <p:nvPr>
-            <p:ph type="body" sz="half" idx="1"/>
-          </p:nvPr>
-        </p:nvSpPr>
-        <p:spPr>
-          <a:xfrm>
-            <a:off x="9448803" y="2045737"/>
-            <a:ext cx="5918340" cy="9091186"/>
-          </a:xfrm>
-        </p:spPr>
-        <p:txBody>
-          <a:bodyPr>
-            <a:noAutofit/>
-          </a:bodyPr>
-          <a:lstStyle/>
-          <a:p>
-            <a:pPr marL="457200" indent="-457200">
-              <a:lnSpc>
-                <a:spcPct val="150000"/>
-              </a:lnSpc>
-              <a:buFont typeface="Arial" panose="020B0604020202020204" pitchFamily="34" charset="0"/>
-              <a:buChar char="•"/>
-            </a:pPr>
-            <a:r>
-              <a:rPr lang="ru-RU" sz="2800" dirty="0" smtClean="0">
-                <a:solidFill>
-                  <a:schemeClr val="bg1"/>
-                </a:solidFill>
-              </a:rPr>
-              <a:t>Автоматический сбор результатов после теста.</a:t>
-            </a:r>
-          </a:p>
-          <a:p>
-            <a:pPr marL="457200" indent="-457200">
-              <a:lnSpc>
-                <a:spcPct val="150000"/>
-              </a:lnSpc>
-              <a:buFont typeface="Arial" panose="020B0604020202020204" pitchFamily="34" charset="0"/>
-              <a:buChar char="•"/>
-            </a:pPr>
-            <a:endParaRPr lang="ru-RU" sz="2800" dirty="0" smtClean="0">
-              <a:solidFill>
-                <a:schemeClr val="bg1"/>
-              </a:solidFill>
-            </a:endParaRPr>
-          </a:p>
-          <a:p>
-            <a:pPr marL="457200" indent="-457200">
-              <a:lnSpc>
-                <a:spcPct val="150000"/>
-              </a:lnSpc>
-              <a:buFont typeface="Arial" panose="020B0604020202020204" pitchFamily="34" charset="0"/>
-              <a:buChar char="•"/>
-            </a:pPr>
-            <a:r>
-              <a:rPr lang="ru-RU" sz="2800" dirty="0" smtClean="0">
-                <a:solidFill>
-                  <a:schemeClr val="bg1"/>
-                </a:solidFill>
-              </a:rPr>
-              <a:t>Оповещение всех заинтересованных</a:t>
-            </a:r>
-          </a:p>
-          <a:p>
-            <a:pPr>
-              <a:lnSpc>
-                <a:spcPct val="150000"/>
-              </a:lnSpc>
-            </a:pPr>
-            <a:r>
-              <a:rPr lang="ru-RU" sz="2800" dirty="0" smtClean="0">
-                <a:solidFill>
-                  <a:schemeClr val="bg1"/>
-                </a:solidFill>
-              </a:rPr>
-              <a:t>    о завершении теста.</a:t>
-            </a:r>
-          </a:p>
-          <a:p>
-            <a:pPr marL="457200" indent="-457200">
-              <a:lnSpc>
-                <a:spcPct val="150000"/>
-              </a:lnSpc>
-              <a:buFont typeface="Arial" panose="020B0604020202020204" pitchFamily="34" charset="0"/>
-              <a:buChar char="•"/>
-            </a:pPr>
-            <a:endParaRPr lang="ru-RU" sz="2800" dirty="0" smtClean="0">
-              <a:solidFill>
-                <a:schemeClr val="bg1"/>
-              </a:solidFill>
-            </a:endParaRPr>
-          </a:p>
-          <a:p>
-            <a:pPr marL="457200" indent="-457200">
-              <a:lnSpc>
-                <a:spcPct val="150000"/>
-              </a:lnSpc>
-              <a:buFont typeface="Arial" panose="020B0604020202020204" pitchFamily="34" charset="0"/>
-              <a:buChar char="•"/>
-            </a:pPr>
-            <a:r>
-              <a:rPr lang="ru-RU" sz="2800" dirty="0" smtClean="0">
-                <a:solidFill>
-                  <a:schemeClr val="bg1"/>
-                </a:solidFill>
-              </a:rPr>
-              <a:t>Возможность сразу проанализировать поведение системы.</a:t>
-            </a:r>
-          </a:p>
-          <a:p>
-            <a:pPr marL="457200" indent="-457200">
-              <a:lnSpc>
-                <a:spcPct val="150000"/>
-              </a:lnSpc>
-              <a:buFont typeface="Arial" panose="020B0604020202020204" pitchFamily="34" charset="0"/>
-              <a:buChar char="•"/>
-            </a:pPr>
-            <a:endParaRPr lang="ru-RU" sz="2800" dirty="0" smtClean="0">
-              <a:solidFill>
-                <a:schemeClr val="bg1"/>
-              </a:solidFill>
-            </a:endParaRPr>
-          </a:p>
-          <a:p>
-            <a:pPr marL="457200" indent="-457200">
-              <a:lnSpc>
-                <a:spcPct val="150000"/>
-              </a:lnSpc>
-              <a:buFont typeface="Arial" panose="020B0604020202020204" pitchFamily="34" charset="0"/>
-              <a:buChar char="•"/>
-            </a:pPr>
-            <a:r>
-              <a:rPr lang="ru-RU" sz="2800" dirty="0" smtClean="0">
-                <a:solidFill>
-                  <a:schemeClr val="bg1"/>
-                </a:solidFill>
-              </a:rPr>
-              <a:t>Быстрое предоставление выводов и рекомендаций.</a:t>
-            </a:r>
-          </a:p>
-        </p:txBody>
-      </p:sp>
-      <p:sp>
-        <p:nvSpPr>
-          <p:cNvPr id="173" name="Региональная сеть Промсвязьбанка насчитывает более 300 офисов, более 10 000 банкоматов (включая банкоматы банков-партнеров) и более 200 терминалов самообслуживания по всей России. Продукты и услуги представлены в подавляющем большинстве регионов, охватывающих порядка 88% населения России.…"/>
-          <p:cNvSpPr txBox="1"/>
-          <p:nvPr/>
-        </p:nvSpPr>
-        <p:spPr>
-          <a:xfrm>
-            <a:off x="8580232" y="1998847"/>
-            <a:ext cx="7022429" cy="8518688"/>
-          </a:xfrm>
-          <a:prstGeom prst="rect">
-            <a:avLst/>
-          </a:prstGeom>
-          <a:ln w="3175">
-            <a:miter lim="400000"/>
-          </a:ln>
-          <a:extLst>
-            <a:ext uri="{C572A759-6A51-4108-AA02-DFA0A04FC94B}">
-              <ma14:wrappingTextBoxFlag xmlns="" xmlns:m="http://schemas.openxmlformats.org/officeDocument/2006/math" xmlns:a14="http://schemas.microsoft.com/office/drawing/2010/main" xmlns:ma14="http://schemas.microsoft.com/office/mac/drawingml/2011/main" val="1"/>
-            </a:ext>
-          </a:extLst>
-        </p:spPr>
-        <p:txBody>
-          <a:bodyPr lIns="59893" tIns="59893" rIns="59893" bIns="59893">
-            <a:normAutofit/>
-          </a:bodyPr>
-          <a:lstStyle/>
-          <a:p>
-            <a:pPr algn="l" defTabSz="457200">
-              <a:defRPr sz="1400" b="0">
-                <a:latin typeface="+mn-lt"/>
-                <a:ea typeface="+mn-ea"/>
-                <a:cs typeface="+mn-cs"/>
-                <a:sym typeface="Verdana"/>
-              </a:defRPr>
-            </a:pPr>
-            <a:endParaRPr dirty="0"/>
-          </a:p>
-        </p:txBody>
-      </p:sp>
-      <p:sp>
-        <p:nvSpPr>
-          <p:cNvPr id="8" name="Слайд с текстом и фото"/>
-          <p:cNvSpPr txBox="1">
-            <a:spLocks/>
-          </p:cNvSpPr>
-          <p:nvPr/>
-        </p:nvSpPr>
-        <p:spPr>
-          <a:xfrm>
-            <a:off x="1065305" y="271157"/>
-            <a:ext cx="12067029" cy="885835"/>
-          </a:xfrm>
-          <a:prstGeom prst="rect">
-            <a:avLst/>
-          </a:prstGeom>
-          <a:ln w="3175">
-            <a:miter lim="400000"/>
-          </a:ln>
-          <a:extLst>
-            <a:ext uri="{C572A759-6A51-4108-AA02-DFA0A04FC94B}">
-              <ma14:wrappingTextBoxFlag xmlns="" xmlns:m="http://schemas.openxmlformats.org/officeDocument/2006/math" xmlns:a14="http://schemas.microsoft.com/office/drawing/2010/main" xmlns:ma14="http://schemas.microsoft.com/office/mac/drawingml/2011/main" val="1"/>
-            </a:ext>
-          </a:extLst>
-        </p:spPr>
-        <p:txBody>
-          <a:bodyPr lIns="59893" tIns="59893" rIns="59893" bIns="59893" anchor="ctr">
-            <a:normAutofit/>
-          </a:bodyPr>
-          <a:lstStyle>
-            <a:lvl1pPr marL="0" marR="0" indent="0" algn="l" defTabSz="689173" latinLnBrk="0">
-              <a:lnSpc>
-                <a:spcPct val="100000"/>
-              </a:lnSpc>
-              <a:spcBef>
-                <a:spcPts val="0"/>
-              </a:spcBef>
-              <a:spcAft>
-                <a:spcPts val="0"/>
-              </a:spcAft>
-              <a:buClrTx/>
-              <a:buSzTx/>
-              <a:buFontTx/>
-              <a:buNone/>
-              <a:tabLst/>
-              <a:defRPr sz="2400" b="1" i="0" u="none" strike="noStrike" cap="none" spc="0" baseline="0">
-                <a:ln>
-                  <a:noFill/>
-                </a:ln>
-                <a:solidFill>
-                  <a:srgbClr val="1E1E8C"/>
-                </a:solidFill>
-                <a:uFillTx/>
-                <a:latin typeface="+mn-lt"/>
-                <a:ea typeface="+mn-ea"/>
-                <a:cs typeface="+mn-cs"/>
-                <a:sym typeface="Verdana"/>
-              </a:defRPr>
-            </a:lvl1pPr>
-            <a:lvl2pPr marL="0" marR="0" indent="0" algn="l" defTabSz="689173" latinLnBrk="0">
-              <a:lnSpc>
-                <a:spcPct val="100000"/>
-              </a:lnSpc>
-              <a:spcBef>
-                <a:spcPts val="0"/>
-              </a:spcBef>
-              <a:spcAft>
-                <a:spcPts val="0"/>
-              </a:spcAft>
-              <a:buClrTx/>
-              <a:buSzTx/>
-              <a:buFontTx/>
-              <a:buNone/>
-              <a:tabLst/>
-              <a:defRPr sz="2400" b="1" i="0" u="none" strike="noStrike" cap="none" spc="0" baseline="0">
-                <a:ln>
-                  <a:noFill/>
-                </a:ln>
-                <a:solidFill>
-                  <a:srgbClr val="1E1E8C"/>
-                </a:solidFill>
-                <a:uFillTx/>
-                <a:latin typeface="+mn-lt"/>
-                <a:ea typeface="+mn-ea"/>
-                <a:cs typeface="+mn-cs"/>
-                <a:sym typeface="Verdana"/>
-              </a:defRPr>
-            </a:lvl2pPr>
-            <a:lvl3pPr marL="0" marR="0" indent="0" algn="l" defTabSz="689173" latinLnBrk="0">
-              <a:lnSpc>
-                <a:spcPct val="100000"/>
-              </a:lnSpc>
-              <a:spcBef>
-                <a:spcPts val="0"/>
-              </a:spcBef>
-              <a:spcAft>
-                <a:spcPts val="0"/>
-              </a:spcAft>
-              <a:buClrTx/>
-              <a:buSzTx/>
-              <a:buFontTx/>
-              <a:buNone/>
-              <a:tabLst/>
-              <a:defRPr sz="2400" b="1" i="0" u="none" strike="noStrike" cap="none" spc="0" baseline="0">
-                <a:ln>
-                  <a:noFill/>
-                </a:ln>
-                <a:solidFill>
-                  <a:srgbClr val="1E1E8C"/>
-                </a:solidFill>
-                <a:uFillTx/>
-                <a:latin typeface="+mn-lt"/>
-                <a:ea typeface="+mn-ea"/>
-                <a:cs typeface="+mn-cs"/>
-                <a:sym typeface="Verdana"/>
-              </a:defRPr>
-            </a:lvl3pPr>
-            <a:lvl4pPr marL="0" marR="0" indent="0" algn="l" defTabSz="689173" latinLnBrk="0">
-              <a:lnSpc>
-                <a:spcPct val="100000"/>
-              </a:lnSpc>
-              <a:spcBef>
-                <a:spcPts val="0"/>
-              </a:spcBef>
-              <a:spcAft>
-                <a:spcPts val="0"/>
-              </a:spcAft>
-              <a:buClrTx/>
-              <a:buSzTx/>
-              <a:buFontTx/>
-              <a:buNone/>
-              <a:tabLst/>
-              <a:defRPr sz="2400" b="1" i="0" u="none" strike="noStrike" cap="none" spc="0" baseline="0">
-                <a:ln>
-                  <a:noFill/>
-                </a:ln>
-                <a:solidFill>
-                  <a:srgbClr val="1E1E8C"/>
-                </a:solidFill>
-                <a:uFillTx/>
-                <a:latin typeface="+mn-lt"/>
-                <a:ea typeface="+mn-ea"/>
-                <a:cs typeface="+mn-cs"/>
-                <a:sym typeface="Verdana"/>
-              </a:defRPr>
-            </a:lvl4pPr>
-            <a:lvl5pPr marL="0" marR="0" indent="0" algn="l" defTabSz="689173" latinLnBrk="0">
-              <a:lnSpc>
-                <a:spcPct val="100000"/>
-              </a:lnSpc>
-              <a:spcBef>
-                <a:spcPts val="0"/>
-              </a:spcBef>
-              <a:spcAft>
-                <a:spcPts val="0"/>
-              </a:spcAft>
-              <a:buClrTx/>
-              <a:buSzTx/>
-              <a:buFontTx/>
-              <a:buNone/>
-              <a:tabLst/>
-              <a:defRPr sz="2400" b="1" i="0" u="none" strike="noStrike" cap="none" spc="0" baseline="0">
-                <a:ln>
-                  <a:noFill/>
-                </a:ln>
-                <a:solidFill>
-                  <a:srgbClr val="1E1E8C"/>
-                </a:solidFill>
-                <a:uFillTx/>
-                <a:latin typeface="+mn-lt"/>
-                <a:ea typeface="+mn-ea"/>
-                <a:cs typeface="+mn-cs"/>
-                <a:sym typeface="Verdana"/>
-              </a:defRPr>
-            </a:lvl5pPr>
-            <a:lvl6pPr marL="0" marR="0" indent="0" algn="l" defTabSz="689173" latinLnBrk="0">
-              <a:lnSpc>
-                <a:spcPct val="100000"/>
-              </a:lnSpc>
-              <a:spcBef>
-                <a:spcPts val="0"/>
-              </a:spcBef>
-              <a:spcAft>
-                <a:spcPts val="0"/>
-              </a:spcAft>
-              <a:buClrTx/>
-              <a:buSzTx/>
-              <a:buFontTx/>
-              <a:buNone/>
-              <a:tabLst/>
-              <a:defRPr sz="2400" b="1" i="0" u="none" strike="noStrike" cap="none" spc="0" baseline="0">
-                <a:ln>
-                  <a:noFill/>
-                </a:ln>
-                <a:solidFill>
-                  <a:srgbClr val="1E1E8C"/>
-                </a:solidFill>
-                <a:uFillTx/>
-                <a:latin typeface="+mn-lt"/>
-                <a:ea typeface="+mn-ea"/>
-                <a:cs typeface="+mn-cs"/>
-                <a:sym typeface="Verdana"/>
-              </a:defRPr>
-            </a:lvl6pPr>
-            <a:lvl7pPr marL="0" marR="0" indent="0" algn="l" defTabSz="689173" latinLnBrk="0">
-              <a:lnSpc>
-                <a:spcPct val="100000"/>
-              </a:lnSpc>
-              <a:spcBef>
-                <a:spcPts val="0"/>
-              </a:spcBef>
-              <a:spcAft>
-                <a:spcPts val="0"/>
-              </a:spcAft>
-              <a:buClrTx/>
-              <a:buSzTx/>
-              <a:buFontTx/>
-              <a:buNone/>
-              <a:tabLst/>
-              <a:defRPr sz="2400" b="1" i="0" u="none" strike="noStrike" cap="none" spc="0" baseline="0">
-                <a:ln>
-                  <a:noFill/>
-                </a:ln>
-                <a:solidFill>
-                  <a:srgbClr val="1E1E8C"/>
-                </a:solidFill>
-                <a:uFillTx/>
-                <a:latin typeface="+mn-lt"/>
-                <a:ea typeface="+mn-ea"/>
-                <a:cs typeface="+mn-cs"/>
-                <a:sym typeface="Verdana"/>
-              </a:defRPr>
-            </a:lvl7pPr>
-            <a:lvl8pPr marL="0" marR="0" indent="0" algn="l" defTabSz="689173" latinLnBrk="0">
-              <a:lnSpc>
-                <a:spcPct val="100000"/>
-              </a:lnSpc>
-              <a:spcBef>
-                <a:spcPts val="0"/>
-              </a:spcBef>
-              <a:spcAft>
-                <a:spcPts val="0"/>
-              </a:spcAft>
-              <a:buClrTx/>
-              <a:buSzTx/>
-              <a:buFontTx/>
-              <a:buNone/>
-              <a:tabLst/>
-              <a:defRPr sz="2400" b="1" i="0" u="none" strike="noStrike" cap="none" spc="0" baseline="0">
-                <a:ln>
-                  <a:noFill/>
-                </a:ln>
-                <a:solidFill>
-                  <a:srgbClr val="1E1E8C"/>
-                </a:solidFill>
-                <a:uFillTx/>
-                <a:latin typeface="+mn-lt"/>
-                <a:ea typeface="+mn-ea"/>
-                <a:cs typeface="+mn-cs"/>
-                <a:sym typeface="Verdana"/>
-              </a:defRPr>
-            </a:lvl8pPr>
-            <a:lvl9pPr marL="0" marR="0" indent="0" algn="l" defTabSz="689173" latinLnBrk="0">
-              <a:lnSpc>
-                <a:spcPct val="100000"/>
-              </a:lnSpc>
-              <a:spcBef>
-                <a:spcPts val="0"/>
-              </a:spcBef>
-              <a:spcAft>
-                <a:spcPts val="0"/>
-              </a:spcAft>
-              <a:buClrTx/>
-              <a:buSzTx/>
-              <a:buFontTx/>
-              <a:buNone/>
-              <a:tabLst/>
-              <a:defRPr sz="2400" b="1" i="0" u="none" strike="noStrike" cap="none" spc="0" baseline="0">
-                <a:ln>
-                  <a:noFill/>
-                </a:ln>
-                <a:solidFill>
-                  <a:srgbClr val="1E1E8C"/>
-                </a:solidFill>
-                <a:uFillTx/>
-                <a:latin typeface="+mn-lt"/>
-                <a:ea typeface="+mn-ea"/>
-                <a:cs typeface="+mn-cs"/>
-                <a:sym typeface="Verdana"/>
-              </a:defRPr>
-            </a:lvl9pPr>
-          </a:lstStyle>
-          <a:p>
-            <a:pPr hangingPunct="1"/>
-            <a:r>
-              <a:rPr lang="ru-RU" sz="3200" dirty="0" smtClean="0">
-                <a:solidFill>
-                  <a:srgbClr val="002060"/>
-                </a:solidFill>
-              </a:rPr>
-              <a:t>Результат</a:t>
-            </a:r>
-            <a:endParaRPr lang="ru-RU" sz="3200" dirty="0">
-              <a:solidFill>
-                <a:srgbClr val="002060"/>
-              </a:solidFill>
-            </a:endParaRPr>
-          </a:p>
-        </p:txBody>
-      </p:sp>
-    </p:spTree>
-    <p:extLst>
-      <p:ext uri="{BB962C8B-B14F-4D97-AF65-F5344CB8AC3E}">
-        <p14:creationId xmlns:p14="http://schemas.microsoft.com/office/powerpoint/2010/main" val="172407011"/>
-      </p:ext>
-    </p:extLst>
-  </p:cSld>
-  <p:clrMapOvr>
-    <a:masterClrMapping/>
-  </p:clrMapOvr>
-  <p:transition spd="med"/>
-  <p:timing>
-    <p:tnLst>
-      <p:par>
-        <p:cTn id="1" dur="indefinite" restart="never" nodeType="tmRoot"/>
-      </p:par>
-    </p:tnLst>
-  </p:timing>
-</p:sld>
-</file>
-
-<file path=ppt/slides/slide8.xml><?xml version="1.0" encoding="utf-8"?>
-<p:sld xmlns:a="http://schemas.openxmlformats.org/drawingml/2006/main" xmlns:r="http://schemas.openxmlformats.org/officeDocument/2006/relationships" xmlns:p="http://schemas.openxmlformats.org/presentationml/2006/main">
-  <p:cSld>
-    <p:spTree>
-      <p:nvGrpSpPr>
-        <p:cNvPr id="1" name=""/>
-        <p:cNvGrpSpPr/>
-        <p:nvPr/>
-      </p:nvGrpSpPr>
-      <p:grpSpPr>
-        <a:xfrm>
-          <a:off x="0" y="0"/>
-          <a:ext cx="0" cy="0"/>
-          <a:chOff x="0" y="0"/>
-          <a:chExt cx="0" cy="0"/>
-        </a:xfrm>
-      </p:grpSpPr>
-      <p:pic>
-        <p:nvPicPr>
           <p:cNvPr id="6" name="Рисунок 5"/>
           <p:cNvPicPr>
             <a:picLocks noChangeAspect="1"/>
@@ -5111,7 +4493,7 @@
           </a:ln>
           <a:extLst>
             <a:ext uri="{C572A759-6A51-4108-AA02-DFA0A04FC94B}">
-              <ma14:wrappingTextBoxFlag xmlns="" xmlns:m="http://schemas.openxmlformats.org/officeDocument/2006/math" xmlns:a14="http://schemas.microsoft.com/office/drawing/2010/main" xmlns:ma14="http://schemas.microsoft.com/office/mac/drawingml/2011/main" val="1"/>
+              <ma14:wrappingTextBoxFlag xmlns:ma14="http://schemas.microsoft.com/office/mac/drawingml/2011/main" xmlns:a14="http://schemas.microsoft.com/office/drawing/2010/main" xmlns:m="http://schemas.openxmlformats.org/officeDocument/2006/math" xmlns="" val="1"/>
             </a:ext>
           </a:extLst>
         </p:spPr>
@@ -5421,7 +4803,7 @@
           </a:ln>
           <a:extLst>
             <a:ext uri="{C572A759-6A51-4108-AA02-DFA0A04FC94B}">
-              <ma14:wrappingTextBoxFlag xmlns="" xmlns:m="http://schemas.openxmlformats.org/officeDocument/2006/math" xmlns:a14="http://schemas.microsoft.com/office/drawing/2010/main" xmlns:ma14="http://schemas.microsoft.com/office/mac/drawingml/2011/main" val="1"/>
+              <ma14:wrappingTextBoxFlag xmlns:ma14="http://schemas.microsoft.com/office/mac/drawingml/2011/main" xmlns:a14="http://schemas.microsoft.com/office/drawing/2010/main" xmlns:m="http://schemas.openxmlformats.org/officeDocument/2006/math" xmlns="" val="1"/>
             </a:ext>
           </a:extLst>
         </p:spPr>
@@ -5731,7 +5113,7 @@
           </a:ln>
           <a:extLst>
             <a:ext uri="{C572A759-6A51-4108-AA02-DFA0A04FC94B}">
-              <ma14:wrappingTextBoxFlag xmlns="" xmlns:m="http://schemas.openxmlformats.org/officeDocument/2006/math" xmlns:a14="http://schemas.microsoft.com/office/drawing/2010/main" xmlns:ma14="http://schemas.microsoft.com/office/mac/drawingml/2011/main" val="1"/>
+              <ma14:wrappingTextBoxFlag xmlns:ma14="http://schemas.microsoft.com/office/mac/drawingml/2011/main" xmlns:a14="http://schemas.microsoft.com/office/drawing/2010/main" xmlns:m="http://schemas.openxmlformats.org/officeDocument/2006/math" xmlns="" val="1"/>
             </a:ext>
           </a:extLst>
         </p:spPr>
@@ -6024,6 +5406,624 @@
     <p:extLst>
       <p:ext uri="{BB962C8B-B14F-4D97-AF65-F5344CB8AC3E}">
         <p14:creationId xmlns:p14="http://schemas.microsoft.com/office/powerpoint/2010/main" val="3960495340"/>
+      </p:ext>
+    </p:extLst>
+  </p:cSld>
+  <p:clrMapOvr>
+    <a:masterClrMapping/>
+  </p:clrMapOvr>
+  <p:transition spd="med"/>
+  <p:timing>
+    <p:tnLst>
+      <p:par>
+        <p:cTn id="1" dur="indefinite" restart="never" nodeType="tmRoot"/>
+      </p:par>
+    </p:tnLst>
+  </p:timing>
+</p:sld>
+</file>
+
+<file path=ppt/slides/slide8.xml><?xml version="1.0" encoding="utf-8"?>
+<p:sld xmlns:a="http://schemas.openxmlformats.org/drawingml/2006/main" xmlns:r="http://schemas.openxmlformats.org/officeDocument/2006/relationships" xmlns:p="http://schemas.openxmlformats.org/presentationml/2006/main">
+  <p:cSld>
+    <p:spTree>
+      <p:nvGrpSpPr>
+        <p:cNvPr id="1" name=""/>
+        <p:cNvGrpSpPr/>
+        <p:nvPr/>
+      </p:nvGrpSpPr>
+      <p:grpSpPr>
+        <a:xfrm>
+          <a:off x="0" y="0"/>
+          <a:ext cx="0" cy="0"/>
+          <a:chOff x="0" y="0"/>
+          <a:chExt cx="0" cy="0"/>
+        </a:xfrm>
+      </p:grpSpPr>
+      <p:pic>
+        <p:nvPicPr>
+          <p:cNvPr id="4098" name="Picture 2" descr="https://community.atlassian.com/t5/image/serverpage/image-id/47779iCB5165BBDF13640C?v=1.0"/>
+          <p:cNvPicPr>
+            <a:picLocks noChangeAspect="1" noChangeArrowheads="1"/>
+          </p:cNvPicPr>
+          <p:nvPr/>
+        </p:nvPicPr>
+        <p:blipFill>
+          <a:blip r:embed="rId3">
+            <a:extLst>
+              <a:ext uri="{28A0092B-C50C-407E-A947-70E740481C1C}">
+                <a14:useLocalDpi xmlns:a14="http://schemas.microsoft.com/office/drawing/2010/main" val="0"/>
+              </a:ext>
+            </a:extLst>
+          </a:blip>
+          <a:srcRect/>
+          <a:stretch>
+            <a:fillRect/>
+          </a:stretch>
+        </p:blipFill>
+        <p:spPr bwMode="auto">
+          <a:xfrm>
+            <a:off x="852121" y="2094617"/>
+            <a:ext cx="7061630" cy="8473958"/>
+          </a:xfrm>
+          <a:prstGeom prst="rect">
+            <a:avLst/>
+          </a:prstGeom>
+          <a:noFill/>
+          <a:extLst>
+            <a:ext uri="{909E8E84-426E-40DD-AFC4-6F175D3DCCD1}">
+              <a14:hiddenFill xmlns:a14="http://schemas.microsoft.com/office/drawing/2010/main">
+                <a:solidFill>
+                  <a:srgbClr val="FFFFFF"/>
+                </a:solidFill>
+              </a14:hiddenFill>
+            </a:ext>
+          </a:extLst>
+        </p:spPr>
+      </p:pic>
+      <p:sp>
+        <p:nvSpPr>
+          <p:cNvPr id="10" name="Rectangle"/>
+          <p:cNvSpPr/>
+          <p:nvPr/>
+        </p:nvSpPr>
+        <p:spPr>
+          <a:xfrm>
+            <a:off x="8323384" y="1173320"/>
+            <a:ext cx="7932616" cy="10349208"/>
+          </a:xfrm>
+          <a:prstGeom prst="rect">
+            <a:avLst/>
+          </a:prstGeom>
+          <a:solidFill>
+            <a:srgbClr val="61646A"/>
+          </a:solidFill>
+          <a:ln w="3175">
+            <a:miter lim="400000"/>
+          </a:ln>
+        </p:spPr>
+        <p:txBody>
+          <a:bodyPr lIns="67380" tIns="67380" rIns="67380" bIns="67380" anchor="ctr"/>
+          <a:lstStyle/>
+          <a:p>
+            <a:pPr>
+              <a:defRPr sz="2400" b="0">
+                <a:solidFill>
+                  <a:srgbClr val="FFFFFF"/>
+                </a:solidFill>
+                <a:latin typeface="+mj-lt"/>
+                <a:ea typeface="+mj-ea"/>
+                <a:cs typeface="+mj-cs"/>
+                <a:sym typeface="Helvetica Neue Medium"/>
+              </a:defRPr>
+            </a:pPr>
+            <a:endParaRPr/>
+          </a:p>
+        </p:txBody>
+      </p:sp>
+      <p:sp>
+        <p:nvSpPr>
+          <p:cNvPr id="2" name="Текст 1"/>
+          <p:cNvSpPr>
+            <a:spLocks noGrp="1"/>
+          </p:cNvSpPr>
+          <p:nvPr>
+            <p:ph type="body" sz="half" idx="1"/>
+          </p:nvPr>
+        </p:nvSpPr>
+        <p:spPr>
+          <a:xfrm>
+            <a:off x="9448803" y="2045737"/>
+            <a:ext cx="5918340" cy="9091186"/>
+          </a:xfrm>
+        </p:spPr>
+        <p:txBody>
+          <a:bodyPr>
+            <a:noAutofit/>
+          </a:bodyPr>
+          <a:lstStyle/>
+          <a:p>
+            <a:pPr marL="457200" indent="-457200">
+              <a:lnSpc>
+                <a:spcPct val="150000"/>
+              </a:lnSpc>
+              <a:buFont typeface="Arial" panose="020B0604020202020204" pitchFamily="34" charset="0"/>
+              <a:buChar char="•"/>
+            </a:pPr>
+            <a:r>
+              <a:rPr lang="ru-RU" sz="2800" dirty="0" smtClean="0">
+                <a:solidFill>
+                  <a:schemeClr val="bg1"/>
+                </a:solidFill>
+              </a:rPr>
+              <a:t>Автоматический сбор результатов после теста.</a:t>
+            </a:r>
+          </a:p>
+          <a:p>
+            <a:pPr marL="457200" indent="-457200">
+              <a:lnSpc>
+                <a:spcPct val="150000"/>
+              </a:lnSpc>
+              <a:buFont typeface="Arial" panose="020B0604020202020204" pitchFamily="34" charset="0"/>
+              <a:buChar char="•"/>
+            </a:pPr>
+            <a:endParaRPr lang="ru-RU" sz="2800" dirty="0" smtClean="0">
+              <a:solidFill>
+                <a:schemeClr val="bg1"/>
+              </a:solidFill>
+            </a:endParaRPr>
+          </a:p>
+          <a:p>
+            <a:pPr marL="457200" indent="-457200">
+              <a:lnSpc>
+                <a:spcPct val="150000"/>
+              </a:lnSpc>
+              <a:buFont typeface="Arial" panose="020B0604020202020204" pitchFamily="34" charset="0"/>
+              <a:buChar char="•"/>
+            </a:pPr>
+            <a:r>
+              <a:rPr lang="ru-RU" sz="2800" dirty="0" smtClean="0">
+                <a:solidFill>
+                  <a:schemeClr val="bg1"/>
+                </a:solidFill>
+              </a:rPr>
+              <a:t>Оповещение всех заинтересованных</a:t>
+            </a:r>
+          </a:p>
+          <a:p>
+            <a:pPr>
+              <a:lnSpc>
+                <a:spcPct val="150000"/>
+              </a:lnSpc>
+            </a:pPr>
+            <a:r>
+              <a:rPr lang="ru-RU" sz="2800" dirty="0" smtClean="0">
+                <a:solidFill>
+                  <a:schemeClr val="bg1"/>
+                </a:solidFill>
+              </a:rPr>
+              <a:t>    о завершении теста.</a:t>
+            </a:r>
+          </a:p>
+          <a:p>
+            <a:pPr marL="457200" indent="-457200">
+              <a:lnSpc>
+                <a:spcPct val="150000"/>
+              </a:lnSpc>
+              <a:buFont typeface="Arial" panose="020B0604020202020204" pitchFamily="34" charset="0"/>
+              <a:buChar char="•"/>
+            </a:pPr>
+            <a:endParaRPr lang="ru-RU" sz="2800" dirty="0" smtClean="0">
+              <a:solidFill>
+                <a:schemeClr val="bg1"/>
+              </a:solidFill>
+            </a:endParaRPr>
+          </a:p>
+          <a:p>
+            <a:pPr marL="457200" indent="-457200">
+              <a:lnSpc>
+                <a:spcPct val="150000"/>
+              </a:lnSpc>
+              <a:buFont typeface="Arial" panose="020B0604020202020204" pitchFamily="34" charset="0"/>
+              <a:buChar char="•"/>
+            </a:pPr>
+            <a:r>
+              <a:rPr lang="ru-RU" sz="2800" dirty="0" smtClean="0">
+                <a:solidFill>
+                  <a:schemeClr val="bg1"/>
+                </a:solidFill>
+              </a:rPr>
+              <a:t>Возможность сразу проанализировать поведение системы.</a:t>
+            </a:r>
+          </a:p>
+          <a:p>
+            <a:pPr marL="457200" indent="-457200">
+              <a:lnSpc>
+                <a:spcPct val="150000"/>
+              </a:lnSpc>
+              <a:buFont typeface="Arial" panose="020B0604020202020204" pitchFamily="34" charset="0"/>
+              <a:buChar char="•"/>
+            </a:pPr>
+            <a:endParaRPr lang="ru-RU" sz="2800" dirty="0" smtClean="0">
+              <a:solidFill>
+                <a:schemeClr val="bg1"/>
+              </a:solidFill>
+            </a:endParaRPr>
+          </a:p>
+          <a:p>
+            <a:pPr marL="457200" indent="-457200">
+              <a:lnSpc>
+                <a:spcPct val="150000"/>
+              </a:lnSpc>
+              <a:buFont typeface="Arial" panose="020B0604020202020204" pitchFamily="34" charset="0"/>
+              <a:buChar char="•"/>
+            </a:pPr>
+            <a:r>
+              <a:rPr lang="ru-RU" sz="2800" dirty="0" smtClean="0">
+                <a:solidFill>
+                  <a:schemeClr val="bg1"/>
+                </a:solidFill>
+              </a:rPr>
+              <a:t>Быстрое предоставление выводов и рекомендаций.</a:t>
+            </a:r>
+          </a:p>
+        </p:txBody>
+      </p:sp>
+      <p:sp>
+        <p:nvSpPr>
+          <p:cNvPr id="173" name="Региональная сеть Промсвязьбанка насчитывает более 300 офисов, более 10 000 банкоматов (включая банкоматы банков-партнеров) и более 200 терминалов самообслуживания по всей России. Продукты и услуги представлены в подавляющем большинстве регионов, охватывающих порядка 88% населения России.…"/>
+          <p:cNvSpPr txBox="1"/>
+          <p:nvPr/>
+        </p:nvSpPr>
+        <p:spPr>
+          <a:xfrm>
+            <a:off x="8580232" y="1998847"/>
+            <a:ext cx="7022429" cy="8518688"/>
+          </a:xfrm>
+          <a:prstGeom prst="rect">
+            <a:avLst/>
+          </a:prstGeom>
+          <a:ln w="3175">
+            <a:miter lim="400000"/>
+          </a:ln>
+          <a:extLst>
+            <a:ext uri="{C572A759-6A51-4108-AA02-DFA0A04FC94B}">
+              <ma14:wrappingTextBoxFlag xmlns:ma14="http://schemas.microsoft.com/office/mac/drawingml/2011/main" xmlns:a14="http://schemas.microsoft.com/office/drawing/2010/main" xmlns:m="http://schemas.openxmlformats.org/officeDocument/2006/math" xmlns="" val="1"/>
+            </a:ext>
+          </a:extLst>
+        </p:spPr>
+        <p:txBody>
+          <a:bodyPr lIns="59893" tIns="59893" rIns="59893" bIns="59893">
+            <a:normAutofit/>
+          </a:bodyPr>
+          <a:lstStyle/>
+          <a:p>
+            <a:pPr algn="l" defTabSz="457200">
+              <a:defRPr sz="1400" b="0">
+                <a:latin typeface="+mn-lt"/>
+                <a:ea typeface="+mn-ea"/>
+                <a:cs typeface="+mn-cs"/>
+                <a:sym typeface="Verdana"/>
+              </a:defRPr>
+            </a:pPr>
+            <a:endParaRPr dirty="0"/>
+          </a:p>
+        </p:txBody>
+      </p:sp>
+      <p:sp>
+        <p:nvSpPr>
+          <p:cNvPr id="8" name="Слайд с текстом и фото"/>
+          <p:cNvSpPr txBox="1">
+            <a:spLocks/>
+          </p:cNvSpPr>
+          <p:nvPr/>
+        </p:nvSpPr>
+        <p:spPr>
+          <a:xfrm>
+            <a:off x="1065305" y="271157"/>
+            <a:ext cx="12067029" cy="885835"/>
+          </a:xfrm>
+          <a:prstGeom prst="rect">
+            <a:avLst/>
+          </a:prstGeom>
+          <a:ln w="3175">
+            <a:miter lim="400000"/>
+          </a:ln>
+          <a:extLst>
+            <a:ext uri="{C572A759-6A51-4108-AA02-DFA0A04FC94B}">
+              <ma14:wrappingTextBoxFlag xmlns:ma14="http://schemas.microsoft.com/office/mac/drawingml/2011/main" xmlns:a14="http://schemas.microsoft.com/office/drawing/2010/main" xmlns:m="http://schemas.openxmlformats.org/officeDocument/2006/math" xmlns="" val="1"/>
+            </a:ext>
+          </a:extLst>
+        </p:spPr>
+        <p:txBody>
+          <a:bodyPr lIns="59893" tIns="59893" rIns="59893" bIns="59893" anchor="ctr">
+            <a:normAutofit/>
+          </a:bodyPr>
+          <a:lstStyle>
+            <a:lvl1pPr marL="0" marR="0" indent="0" algn="l" defTabSz="689173" latinLnBrk="0">
+              <a:lnSpc>
+                <a:spcPct val="100000"/>
+              </a:lnSpc>
+              <a:spcBef>
+                <a:spcPts val="0"/>
+              </a:spcBef>
+              <a:spcAft>
+                <a:spcPts val="0"/>
+              </a:spcAft>
+              <a:buClrTx/>
+              <a:buSzTx/>
+              <a:buFontTx/>
+              <a:buNone/>
+              <a:tabLst/>
+              <a:defRPr sz="2400" b="1" i="0" u="none" strike="noStrike" cap="none" spc="0" baseline="0">
+                <a:ln>
+                  <a:noFill/>
+                </a:ln>
+                <a:solidFill>
+                  <a:srgbClr val="1E1E8C"/>
+                </a:solidFill>
+                <a:uFillTx/>
+                <a:latin typeface="+mn-lt"/>
+                <a:ea typeface="+mn-ea"/>
+                <a:cs typeface="+mn-cs"/>
+                <a:sym typeface="Verdana"/>
+              </a:defRPr>
+            </a:lvl1pPr>
+            <a:lvl2pPr marL="0" marR="0" indent="0" algn="l" defTabSz="689173" latinLnBrk="0">
+              <a:lnSpc>
+                <a:spcPct val="100000"/>
+              </a:lnSpc>
+              <a:spcBef>
+                <a:spcPts val="0"/>
+              </a:spcBef>
+              <a:spcAft>
+                <a:spcPts val="0"/>
+              </a:spcAft>
+              <a:buClrTx/>
+              <a:buSzTx/>
+              <a:buFontTx/>
+              <a:buNone/>
+              <a:tabLst/>
+              <a:defRPr sz="2400" b="1" i="0" u="none" strike="noStrike" cap="none" spc="0" baseline="0">
+                <a:ln>
+                  <a:noFill/>
+                </a:ln>
+                <a:solidFill>
+                  <a:srgbClr val="1E1E8C"/>
+                </a:solidFill>
+                <a:uFillTx/>
+                <a:latin typeface="+mn-lt"/>
+                <a:ea typeface="+mn-ea"/>
+                <a:cs typeface="+mn-cs"/>
+                <a:sym typeface="Verdana"/>
+              </a:defRPr>
+            </a:lvl2pPr>
+            <a:lvl3pPr marL="0" marR="0" indent="0" algn="l" defTabSz="689173" latinLnBrk="0">
+              <a:lnSpc>
+                <a:spcPct val="100000"/>
+              </a:lnSpc>
+              <a:spcBef>
+                <a:spcPts val="0"/>
+              </a:spcBef>
+              <a:spcAft>
+                <a:spcPts val="0"/>
+              </a:spcAft>
+              <a:buClrTx/>
+              <a:buSzTx/>
+              <a:buFontTx/>
+              <a:buNone/>
+              <a:tabLst/>
+              <a:defRPr sz="2400" b="1" i="0" u="none" strike="noStrike" cap="none" spc="0" baseline="0">
+                <a:ln>
+                  <a:noFill/>
+                </a:ln>
+                <a:solidFill>
+                  <a:srgbClr val="1E1E8C"/>
+                </a:solidFill>
+                <a:uFillTx/>
+                <a:latin typeface="+mn-lt"/>
+                <a:ea typeface="+mn-ea"/>
+                <a:cs typeface="+mn-cs"/>
+                <a:sym typeface="Verdana"/>
+              </a:defRPr>
+            </a:lvl3pPr>
+            <a:lvl4pPr marL="0" marR="0" indent="0" algn="l" defTabSz="689173" latinLnBrk="0">
+              <a:lnSpc>
+                <a:spcPct val="100000"/>
+              </a:lnSpc>
+              <a:spcBef>
+                <a:spcPts val="0"/>
+              </a:spcBef>
+              <a:spcAft>
+                <a:spcPts val="0"/>
+              </a:spcAft>
+              <a:buClrTx/>
+              <a:buSzTx/>
+              <a:buFontTx/>
+              <a:buNone/>
+              <a:tabLst/>
+              <a:defRPr sz="2400" b="1" i="0" u="none" strike="noStrike" cap="none" spc="0" baseline="0">
+                <a:ln>
+                  <a:noFill/>
+                </a:ln>
+                <a:solidFill>
+                  <a:srgbClr val="1E1E8C"/>
+                </a:solidFill>
+                <a:uFillTx/>
+                <a:latin typeface="+mn-lt"/>
+                <a:ea typeface="+mn-ea"/>
+                <a:cs typeface="+mn-cs"/>
+                <a:sym typeface="Verdana"/>
+              </a:defRPr>
+            </a:lvl4pPr>
+            <a:lvl5pPr marL="0" marR="0" indent="0" algn="l" defTabSz="689173" latinLnBrk="0">
+              <a:lnSpc>
+                <a:spcPct val="100000"/>
+              </a:lnSpc>
+              <a:spcBef>
+                <a:spcPts val="0"/>
+              </a:spcBef>
+              <a:spcAft>
+                <a:spcPts val="0"/>
+              </a:spcAft>
+              <a:buClrTx/>
+              <a:buSzTx/>
+              <a:buFontTx/>
+              <a:buNone/>
+              <a:tabLst/>
+              <a:defRPr sz="2400" b="1" i="0" u="none" strike="noStrike" cap="none" spc="0" baseline="0">
+                <a:ln>
+                  <a:noFill/>
+                </a:ln>
+                <a:solidFill>
+                  <a:srgbClr val="1E1E8C"/>
+                </a:solidFill>
+                <a:uFillTx/>
+                <a:latin typeface="+mn-lt"/>
+                <a:ea typeface="+mn-ea"/>
+                <a:cs typeface="+mn-cs"/>
+                <a:sym typeface="Verdana"/>
+              </a:defRPr>
+            </a:lvl5pPr>
+            <a:lvl6pPr marL="0" marR="0" indent="0" algn="l" defTabSz="689173" latinLnBrk="0">
+              <a:lnSpc>
+                <a:spcPct val="100000"/>
+              </a:lnSpc>
+              <a:spcBef>
+                <a:spcPts val="0"/>
+              </a:spcBef>
+              <a:spcAft>
+                <a:spcPts val="0"/>
+              </a:spcAft>
+              <a:buClrTx/>
+              <a:buSzTx/>
+              <a:buFontTx/>
+              <a:buNone/>
+              <a:tabLst/>
+              <a:defRPr sz="2400" b="1" i="0" u="none" strike="noStrike" cap="none" spc="0" baseline="0">
+                <a:ln>
+                  <a:noFill/>
+                </a:ln>
+                <a:solidFill>
+                  <a:srgbClr val="1E1E8C"/>
+                </a:solidFill>
+                <a:uFillTx/>
+                <a:latin typeface="+mn-lt"/>
+                <a:ea typeface="+mn-ea"/>
+                <a:cs typeface="+mn-cs"/>
+                <a:sym typeface="Verdana"/>
+              </a:defRPr>
+            </a:lvl6pPr>
+            <a:lvl7pPr marL="0" marR="0" indent="0" algn="l" defTabSz="689173" latinLnBrk="0">
+              <a:lnSpc>
+                <a:spcPct val="100000"/>
+              </a:lnSpc>
+              <a:spcBef>
+                <a:spcPts val="0"/>
+              </a:spcBef>
+              <a:spcAft>
+                <a:spcPts val="0"/>
+              </a:spcAft>
+              <a:buClrTx/>
+              <a:buSzTx/>
+              <a:buFontTx/>
+              <a:buNone/>
+              <a:tabLst/>
+              <a:defRPr sz="2400" b="1" i="0" u="none" strike="noStrike" cap="none" spc="0" baseline="0">
+                <a:ln>
+                  <a:noFill/>
+                </a:ln>
+                <a:solidFill>
+                  <a:srgbClr val="1E1E8C"/>
+                </a:solidFill>
+                <a:uFillTx/>
+                <a:latin typeface="+mn-lt"/>
+                <a:ea typeface="+mn-ea"/>
+                <a:cs typeface="+mn-cs"/>
+                <a:sym typeface="Verdana"/>
+              </a:defRPr>
+            </a:lvl7pPr>
+            <a:lvl8pPr marL="0" marR="0" indent="0" algn="l" defTabSz="689173" latinLnBrk="0">
+              <a:lnSpc>
+                <a:spcPct val="100000"/>
+              </a:lnSpc>
+              <a:spcBef>
+                <a:spcPts val="0"/>
+              </a:spcBef>
+              <a:spcAft>
+                <a:spcPts val="0"/>
+              </a:spcAft>
+              <a:buClrTx/>
+              <a:buSzTx/>
+              <a:buFontTx/>
+              <a:buNone/>
+              <a:tabLst/>
+              <a:defRPr sz="2400" b="1" i="0" u="none" strike="noStrike" cap="none" spc="0" baseline="0">
+                <a:ln>
+                  <a:noFill/>
+                </a:ln>
+                <a:solidFill>
+                  <a:srgbClr val="1E1E8C"/>
+                </a:solidFill>
+                <a:uFillTx/>
+                <a:latin typeface="+mn-lt"/>
+                <a:ea typeface="+mn-ea"/>
+                <a:cs typeface="+mn-cs"/>
+                <a:sym typeface="Verdana"/>
+              </a:defRPr>
+            </a:lvl8pPr>
+            <a:lvl9pPr marL="0" marR="0" indent="0" algn="l" defTabSz="689173" latinLnBrk="0">
+              <a:lnSpc>
+                <a:spcPct val="100000"/>
+              </a:lnSpc>
+              <a:spcBef>
+                <a:spcPts val="0"/>
+              </a:spcBef>
+              <a:spcAft>
+                <a:spcPts val="0"/>
+              </a:spcAft>
+              <a:buClrTx/>
+              <a:buSzTx/>
+              <a:buFontTx/>
+              <a:buNone/>
+              <a:tabLst/>
+              <a:defRPr sz="2400" b="1" i="0" u="none" strike="noStrike" cap="none" spc="0" baseline="0">
+                <a:ln>
+                  <a:noFill/>
+                </a:ln>
+                <a:solidFill>
+                  <a:srgbClr val="1E1E8C"/>
+                </a:solidFill>
+                <a:uFillTx/>
+                <a:latin typeface="+mn-lt"/>
+                <a:ea typeface="+mn-ea"/>
+                <a:cs typeface="+mn-cs"/>
+                <a:sym typeface="Verdana"/>
+              </a:defRPr>
+            </a:lvl9pPr>
+          </a:lstStyle>
+          <a:p>
+            <a:pPr hangingPunct="1"/>
+            <a:r>
+              <a:rPr lang="ru-RU" sz="3200" dirty="0" smtClean="0">
+                <a:solidFill>
+                  <a:srgbClr val="002060"/>
+                </a:solidFill>
+              </a:rPr>
+              <a:t>Результат</a:t>
+            </a:r>
+            <a:endParaRPr lang="ru-RU" sz="3200" dirty="0">
+              <a:solidFill>
+                <a:srgbClr val="002060"/>
+              </a:solidFill>
+            </a:endParaRPr>
+          </a:p>
+        </p:txBody>
+      </p:sp>
+    </p:spTree>
+    <p:extLst>
+      <p:ext uri="{BB962C8B-B14F-4D97-AF65-F5344CB8AC3E}">
+        <p14:creationId xmlns:p14="http://schemas.microsoft.com/office/powerpoint/2010/main" val="172407011"/>
       </p:ext>
     </p:extLst>
   </p:cSld>
@@ -8194,61 +8194,6 @@
 </file>
 
 <file path=customXml/item2.xml><?xml version="1.0" encoding="utf-8"?>
-<?mso-contentType ?>
-<FormTemplates xmlns="http://schemas.microsoft.com/sharepoint/v3/contenttype/forms">
-  <Display>DocumentLibraryForm</Display>
-  <Edit>DocumentLibraryForm</Edit>
-  <New>DocumentLibraryForm</New>
-</FormTemplates>
-</file>
-
-<file path=customXml/item3.xml><?xml version="1.0" encoding="utf-8"?>
-<?mso-contentType ?>
-<spe:Receivers xmlns:spe="http://schemas.microsoft.com/sharepoint/events">
-  <Receiver>
-    <Name>Document ID Generator</Name>
-    <Synchronization>Synchronous</Synchronization>
-    <Type>10001</Type>
-    <SequenceNumber>1000</SequenceNumber>
-    <Assembly>Microsoft.Office.DocumentManagement, Version=14.0.0.0, Culture=neutral, PublicKeyToken=71e9bce111e9429c</Assembly>
-    <Class>Microsoft.Office.DocumentManagement.Internal.DocIdHandler</Class>
-    <Data/>
-    <Filter/>
-  </Receiver>
-  <Receiver>
-    <Name>Document ID Generator</Name>
-    <Synchronization>Synchronous</Synchronization>
-    <Type>10002</Type>
-    <SequenceNumber>1001</SequenceNumber>
-    <Assembly>Microsoft.Office.DocumentManagement, Version=14.0.0.0, Culture=neutral, PublicKeyToken=71e9bce111e9429c</Assembly>
-    <Class>Microsoft.Office.DocumentManagement.Internal.DocIdHandler</Class>
-    <Data/>
-    <Filter/>
-  </Receiver>
-  <Receiver>
-    <Name>Document ID Generator</Name>
-    <Synchronization>Synchronous</Synchronization>
-    <Type>10004</Type>
-    <SequenceNumber>1002</SequenceNumber>
-    <Assembly>Microsoft.Office.DocumentManagement, Version=14.0.0.0, Culture=neutral, PublicKeyToken=71e9bce111e9429c</Assembly>
-    <Class>Microsoft.Office.DocumentManagement.Internal.DocIdHandler</Class>
-    <Data/>
-    <Filter/>
-  </Receiver>
-  <Receiver>
-    <Name>Document ID Generator</Name>
-    <Synchronization>Synchronous</Synchronization>
-    <Type>10006</Type>
-    <SequenceNumber>1003</SequenceNumber>
-    <Assembly>Microsoft.Office.DocumentManagement, Version=14.0.0.0, Culture=neutral, PublicKeyToken=71e9bce111e9429c</Assembly>
-    <Class>Microsoft.Office.DocumentManagement.Internal.DocIdHandler</Class>
-    <Data/>
-    <Filter/>
-  </Receiver>
-</spe:Receivers>
-</file>
-
-<file path=customXml/item4.xml><?xml version="1.0" encoding="utf-8"?>
 <ct:contentTypeSchema xmlns:ct="http://schemas.microsoft.com/office/2006/metadata/contentType" xmlns:ma="http://schemas.microsoft.com/office/2006/metadata/properties/metaAttributes" ct:_="" ma:_="" ma:contentTypeName="Документ" ma:contentTypeID="0x01010014C9A75EC46817499DE2669DDC006347" ma:contentTypeVersion="1" ma:contentTypeDescription="Создание документа." ma:contentTypeScope="" ma:versionID="73a0e448fe90891d8b17fef0234ea22d">
   <xsd:schema xmlns:xsd="http://www.w3.org/2001/XMLSchema" xmlns:xs="http://www.w3.org/2001/XMLSchema" xmlns:p="http://schemas.microsoft.com/office/2006/metadata/properties" xmlns:ns2="83f6983c-7662-436e-97d6-1eb771896459" targetNamespace="http://schemas.microsoft.com/office/2006/metadata/properties" ma:root="true" ma:fieldsID="0c59424fa24619cc0ec7f9ec4c21e618" ns2:_="">
     <xsd:import namespace="83f6983c-7662-436e-97d6-1eb771896459"/>
@@ -8393,6 +8338,61 @@
 </ct:contentTypeSchema>
 </file>
 
+<file path=customXml/item3.xml><?xml version="1.0" encoding="utf-8"?>
+<?mso-contentType ?>
+<spe:Receivers xmlns:spe="http://schemas.microsoft.com/sharepoint/events">
+  <Receiver>
+    <Name>Document ID Generator</Name>
+    <Synchronization>Synchronous</Synchronization>
+    <Type>10001</Type>
+    <SequenceNumber>1000</SequenceNumber>
+    <Assembly>Microsoft.Office.DocumentManagement, Version=14.0.0.0, Culture=neutral, PublicKeyToken=71e9bce111e9429c</Assembly>
+    <Class>Microsoft.Office.DocumentManagement.Internal.DocIdHandler</Class>
+    <Data/>
+    <Filter/>
+  </Receiver>
+  <Receiver>
+    <Name>Document ID Generator</Name>
+    <Synchronization>Synchronous</Synchronization>
+    <Type>10002</Type>
+    <SequenceNumber>1001</SequenceNumber>
+    <Assembly>Microsoft.Office.DocumentManagement, Version=14.0.0.0, Culture=neutral, PublicKeyToken=71e9bce111e9429c</Assembly>
+    <Class>Microsoft.Office.DocumentManagement.Internal.DocIdHandler</Class>
+    <Data/>
+    <Filter/>
+  </Receiver>
+  <Receiver>
+    <Name>Document ID Generator</Name>
+    <Synchronization>Synchronous</Synchronization>
+    <Type>10004</Type>
+    <SequenceNumber>1002</SequenceNumber>
+    <Assembly>Microsoft.Office.DocumentManagement, Version=14.0.0.0, Culture=neutral, PublicKeyToken=71e9bce111e9429c</Assembly>
+    <Class>Microsoft.Office.DocumentManagement.Internal.DocIdHandler</Class>
+    <Data/>
+    <Filter/>
+  </Receiver>
+  <Receiver>
+    <Name>Document ID Generator</Name>
+    <Synchronization>Synchronous</Synchronization>
+    <Type>10006</Type>
+    <SequenceNumber>1003</SequenceNumber>
+    <Assembly>Microsoft.Office.DocumentManagement, Version=14.0.0.0, Culture=neutral, PublicKeyToken=71e9bce111e9429c</Assembly>
+    <Class>Microsoft.Office.DocumentManagement.Internal.DocIdHandler</Class>
+    <Data/>
+    <Filter/>
+  </Receiver>
+</spe:Receivers>
+</file>
+
+<file path=customXml/item4.xml><?xml version="1.0" encoding="utf-8"?>
+<?mso-contentType ?>
+<FormTemplates xmlns="http://schemas.microsoft.com/sharepoint/v3/contenttype/forms">
+  <Display>DocumentLibraryForm</Display>
+  <Edit>DocumentLibraryForm</Edit>
+  <New>DocumentLibraryForm</New>
+</FormTemplates>
+</file>
+
 <file path=customXml/itemProps1.xml><?xml version="1.0" encoding="utf-8"?>
 <ds:datastoreItem xmlns:ds="http://schemas.openxmlformats.org/officeDocument/2006/customXml" ds:itemID="{01D97164-F274-4043-ABD8-D8F45A939FFD}">
   <ds:schemaRefs>
@@ -8410,22 +8410,6 @@
 </file>
 
 <file path=customXml/itemProps2.xml><?xml version="1.0" encoding="utf-8"?>
-<ds:datastoreItem xmlns:ds="http://schemas.openxmlformats.org/officeDocument/2006/customXml" ds:itemID="{08910B4D-60F3-44ED-B92F-073F5EE748DD}">
-  <ds:schemaRefs>
-    <ds:schemaRef ds:uri="http://schemas.microsoft.com/sharepoint/v3/contenttype/forms"/>
-  </ds:schemaRefs>
-</ds:datastoreItem>
-</file>
-
-<file path=customXml/itemProps3.xml><?xml version="1.0" encoding="utf-8"?>
-<ds:datastoreItem xmlns:ds="http://schemas.openxmlformats.org/officeDocument/2006/customXml" ds:itemID="{282BA4AF-769C-4276-8DF1-B6E323FA9C9C}">
-  <ds:schemaRefs>
-    <ds:schemaRef ds:uri="http://schemas.microsoft.com/sharepoint/events"/>
-  </ds:schemaRefs>
-</ds:datastoreItem>
-</file>
-
-<file path=customXml/itemProps4.xml><?xml version="1.0" encoding="utf-8"?>
 <ds:datastoreItem xmlns:ds="http://schemas.openxmlformats.org/officeDocument/2006/customXml" ds:itemID="{4478D6AA-24B3-4C89-8EF7-2BE1D3CFCE77}">
   <ds:schemaRefs>
     <ds:schemaRef ds:uri="http://schemas.microsoft.com/office/2006/metadata/contentType"/>
@@ -8441,4 +8425,20 @@
     <ds:schemaRef ds:uri="http://schemas.microsoft.com/internal/obd"/>
   </ds:schemaRefs>
 </ds:datastoreItem>
+</file>
+
+<file path=customXml/itemProps3.xml><?xml version="1.0" encoding="utf-8"?>
+<ds:datastoreItem xmlns:ds="http://schemas.openxmlformats.org/officeDocument/2006/customXml" ds:itemID="{282BA4AF-769C-4276-8DF1-B6E323FA9C9C}">
+  <ds:schemaRefs>
+    <ds:schemaRef ds:uri="http://schemas.microsoft.com/sharepoint/events"/>
+  </ds:schemaRefs>
+</ds:datastoreItem>
+</file>
+
+<file path=customXml/itemProps4.xml><?xml version="1.0" encoding="utf-8"?>
+<ds:datastoreItem xmlns:ds="http://schemas.openxmlformats.org/officeDocument/2006/customXml" ds:itemID="{08910B4D-60F3-44ED-B92F-073F5EE748DD}">
+  <ds:schemaRefs>
+    <ds:schemaRef ds:uri="http://schemas.microsoft.com/sharepoint/v3/contenttype/forms"/>
+  </ds:schemaRefs>
+</ds:datastoreItem>
 </file>
</xml_diff>